<commit_message>
buscando liturgia por input e melhorando regex de tag
</commit_message>
<xml_diff>
--- a/slide-result/slide.pptx
+++ b/slide-result/slide.pptx
@@ -5076,7 +5076,7 @@
                   <a:srgbClr val="8F1010"/>
                 </a:solidFill>
               </a:rPr>
-              <a:t>5º Domingo  da Páscoa</a:t>
+              <a:t>6º Domingo  da Páscoa</a:t>
             </a:r>
             <a:endParaRPr lang="en-US" dirty="0"/>
           </a:p>
@@ -5111,7 +5111,7 @@
                   <a:srgbClr val="363636"/>
                 </a:solidFill>
               </a:rPr>
-              <a:t>1ª Leitura - At 14,21b-27</a:t>
+              <a:t>1ª Leitura - At 15,1-2.22-29</a:t>
             </a:r>
           </a:p>
           <a:p>
@@ -5124,7 +5124,7 @@
                   <a:srgbClr val="363636"/>
                 </a:solidFill>
               </a:rPr>
-              <a:t>Salmo - Sl 144,8-9.10-11.12-13ab (R.cf.1)</a:t>
+              <a:t>Salmo - Sl 66,2-3.5.6.8 (R. 4)</a:t>
             </a:r>
           </a:p>
           <a:p>
@@ -5137,7 +5137,7 @@
                   <a:srgbClr val="8F1010"/>
                 </a:solidFill>
               </a:rPr>
-              <a:t>Bendirei eternamente vosso santo nome, ó Senhor.</a:t>
+              <a:t> Que as nações vos glorifiquem, ó Senhor, que todas as nações vos glorifiquem!</a:t>
             </a:r>
           </a:p>
           <a:p>
@@ -5150,7 +5150,7 @@
                   <a:srgbClr val="363636"/>
                 </a:solidFill>
               </a:rPr>
-              <a:t>2ª Leitura - Ap 21,1-5a</a:t>
+              <a:t>2ª Leitura - Ap 21,10-14.22-23</a:t>
             </a:r>
           </a:p>
           <a:p>
@@ -5163,7 +5163,7 @@
                   <a:srgbClr val="363636"/>
                 </a:solidFill>
               </a:rPr>
-              <a:t>Evangelho - Jo 13,31-33a.34-35</a:t>
+              <a:t>Evangelho - Jo 14,23-29</a:t>
             </a:r>
             <a:endParaRPr lang="en-US" dirty="0"/>
           </a:p>

</xml_diff>

<commit_message>
add .bat e selecionar musica
</commit_message>
<xml_diff>
--- a/slide-result/slide.pptx
+++ b/slide-result/slide.pptx
@@ -6233,7 +6233,7 @@
                   <a:srgbClr val="8F1010"/>
                 </a:solidFill>
               </a:rPr>
-              <a:t>5ª-feira da 12ª Semana  Do Tempo Comum</a:t>
+              <a:t>São Pedro e São Paulo, Apóstolos . Solenidade</a:t>
             </a:r>
             <a:endParaRPr lang="en-US" dirty="0"/>
           </a:p>
@@ -6268,7 +6268,7 @@
                   <a:srgbClr val="363636"/>
                 </a:solidFill>
               </a:rPr>
-              <a:t>1ª Leitura - Gn 16,1-12.15-16</a:t>
+              <a:t>1ª Leitura - At 12,1-11</a:t>
             </a:r>
           </a:p>
           <a:p>
@@ -6281,7 +6281,7 @@
                   <a:srgbClr val="363636"/>
                 </a:solidFill>
               </a:rPr>
-              <a:t>1ª Leitura - Gn 6b-12.15-16</a:t>
+              <a:t>Salmo - Sl 33(34),2-3.4-5.6-7.8-9 (R. 5)</a:t>
             </a:r>
           </a:p>
           <a:p>
@@ -6294,7 +6294,7 @@
                   <a:srgbClr val="8F1010"/>
                 </a:solidFill>
               </a:rPr>
-              <a:t> Dai graças ao Senhor, porque ele é bom.&lt;/div&gt;  &lt;div class='refrao_salmo'&gt; Aleluia, Aleluia, Aleluia</a:t>
+              <a:t/>
             </a:r>
           </a:p>
           <a:p>
@@ -6307,7 +6307,7 @@
                   <a:srgbClr val="363636"/>
                 </a:solidFill>
               </a:rPr>
-              <a:t>Salmo - Sl 105, 1-2. 3-4a. 4b-5 (R. 1a)</a:t>
+              <a:t>2ª Leitura - 2Tm 4,6-8.17-18</a:t>
             </a:r>
           </a:p>
           <a:p>
@@ -6320,7 +6320,7 @@
                   <a:srgbClr val="363636"/>
                 </a:solidFill>
               </a:rPr>
-              <a:t>Evangelho - Mt 7,21-29</a:t>
+              <a:t>Evangelho - Mt 16,13-19</a:t>
             </a:r>
             <a:endParaRPr lang="en-US" dirty="0"/>
           </a:p>

</xml_diff>